<commit_message>
new attempt at recipe rambler
</commit_message>
<xml_diff>
--- a/pres.pptx
+++ b/pres.pptx
@@ -6,10 +6,12 @@
   </p:sldMasterIdLst>
   <p:sldIdLst>
     <p:sldId id="256" r:id="rId2"/>
-    <p:sldId id="257" r:id="rId3"/>
-    <p:sldId id="258" r:id="rId4"/>
-    <p:sldId id="259" r:id="rId5"/>
-    <p:sldId id="260" r:id="rId6"/>
+    <p:sldId id="263" r:id="rId3"/>
+    <p:sldId id="257" r:id="rId4"/>
+    <p:sldId id="262" r:id="rId5"/>
+    <p:sldId id="259" r:id="rId6"/>
+    <p:sldId id="264" r:id="rId7"/>
+    <p:sldId id="260" r:id="rId8"/>
   </p:sldIdLst>
   <p:sldSz cx="9144000" cy="6858000" type="screen4x3"/>
   <p:notesSz cx="6858000" cy="9144000"/>
@@ -3623,6 +3625,13 @@
   <p:clrMapOvr>
     <a:masterClrMapping/>
   </p:clrMapOvr>
+  <p:timing>
+    <p:tnLst>
+      <p:par>
+        <p:cTn xmlns:p14="http://schemas.microsoft.com/office/powerpoint/2010/main" id="1" dur="indefinite" restart="never" nodeType="tmRoot"/>
+      </p:par>
+    </p:tnLst>
+  </p:timing>
 </p:sld>
 </file>
 
@@ -3658,6 +3667,108 @@
           <a:bodyPr/>
           <a:lstStyle/>
           <a:p>
+            <a:r>
+              <a:rPr lang="en-US" dirty="0" smtClean="0"/>
+              <a:t>The Project</a:t>
+            </a:r>
+            <a:endParaRPr lang="en-US" dirty="0"/>
+          </a:p>
+        </p:txBody>
+      </p:sp>
+      <p:sp>
+        <p:nvSpPr>
+          <p:cNvPr id="3" name="Content Placeholder 2"/>
+          <p:cNvSpPr>
+            <a:spLocks noGrp="1"/>
+          </p:cNvSpPr>
+          <p:nvPr>
+            <p:ph sz="quarter" idx="13"/>
+          </p:nvPr>
+        </p:nvSpPr>
+        <p:spPr/>
+        <p:txBody>
+          <a:bodyPr/>
+          <a:lstStyle/>
+          <a:p>
+            <a:r>
+              <a:rPr lang="en-US" dirty="0" smtClean="0"/>
+              <a:t>Not your average “recipe” application</a:t>
+            </a:r>
+          </a:p>
+          <a:p>
+            <a:r>
+              <a:rPr lang="en-US" dirty="0" smtClean="0"/>
+              <a:t>Incredibly simple layout</a:t>
+            </a:r>
+          </a:p>
+          <a:p>
+            <a:r>
+              <a:rPr lang="en-US" dirty="0" smtClean="0"/>
+              <a:t>A truly unique experience…</a:t>
+            </a:r>
+          </a:p>
+          <a:p>
+            <a:pPr lvl="1"/>
+            <a:r>
+              <a:rPr lang="en-US" dirty="0" smtClean="0"/>
+              <a:t>Allows users to customize the results of the recipe finder based upon their cultural preferences (i.e. American, Asian, Indian), meal type (i.e. breakfast, lunch, dinner), total time required, and most importantly, ingredients.  </a:t>
+            </a:r>
+            <a:endParaRPr lang="en-US" dirty="0"/>
+          </a:p>
+        </p:txBody>
+      </p:sp>
+    </p:spTree>
+    <p:extLst>
+      <p:ext uri="{BB962C8B-B14F-4D97-AF65-F5344CB8AC3E}">
+        <p14:creationId xmlns:p14="http://schemas.microsoft.com/office/powerpoint/2010/main" val="1967606622"/>
+      </p:ext>
+    </p:extLst>
+  </p:cSld>
+  <p:clrMapOvr>
+    <a:masterClrMapping/>
+  </p:clrMapOvr>
+  <p:timing>
+    <p:tnLst>
+      <p:par>
+        <p:cTn xmlns:p14="http://schemas.microsoft.com/office/powerpoint/2010/main" id="1" dur="indefinite" restart="never" nodeType="tmRoot"/>
+      </p:par>
+    </p:tnLst>
+  </p:timing>
+</p:sld>
+</file>
+
+<file path=ppt/slides/slide3.xml><?xml version="1.0" encoding="utf-8"?>
+<p:sld xmlns:a="http://schemas.openxmlformats.org/drawingml/2006/main" xmlns:r="http://schemas.openxmlformats.org/officeDocument/2006/relationships" xmlns:p="http://schemas.openxmlformats.org/presentationml/2006/main">
+  <p:cSld>
+    <p:spTree>
+      <p:nvGrpSpPr>
+        <p:cNvPr id="1" name=""/>
+        <p:cNvGrpSpPr/>
+        <p:nvPr/>
+      </p:nvGrpSpPr>
+      <p:grpSpPr>
+        <a:xfrm>
+          <a:off x="0" y="0"/>
+          <a:ext cx="0" cy="0"/>
+          <a:chOff x="0" y="0"/>
+          <a:chExt cx="0" cy="0"/>
+        </a:xfrm>
+      </p:grpSpPr>
+      <p:sp>
+        <p:nvSpPr>
+          <p:cNvPr id="2" name="Title 1"/>
+          <p:cNvSpPr>
+            <a:spLocks noGrp="1"/>
+          </p:cNvSpPr>
+          <p:nvPr>
+            <p:ph type="title"/>
+          </p:nvPr>
+        </p:nvSpPr>
+        <p:spPr/>
+        <p:txBody>
+          <a:bodyPr/>
+          <a:lstStyle/>
+          <a:p>
             <a:pPr algn="ctr"/>
             <a:r>
               <a:rPr lang="en-US" dirty="0" smtClean="0"/>
@@ -3680,7 +3791,7 @@
         <p:spPr/>
         <p:txBody>
           <a:bodyPr>
-            <a:normAutofit lnSpcReduction="10000"/>
+            <a:normAutofit fontScale="92500" lnSpcReduction="10000"/>
           </a:bodyPr>
           <a:lstStyle/>
           <a:p>
@@ -3707,13 +3818,66 @@
           <a:p>
             <a:r>
               <a:rPr lang="en-US" dirty="0" smtClean="0"/>
-              <a:t>We strive to enable users to envision many prospective meals based upon the ingredients they find in their fridge</a:t>
-            </a:r>
-          </a:p>
-          <a:p>
+              <a:t>We strive to </a:t>
+            </a:r>
             <a:r>
               <a:rPr lang="en-US" dirty="0" smtClean="0"/>
-              <a:t>By providing instant results an artificial instinct of a master chef is emulated as the user seamlessly interfaces his refrigerator with the recipes found in the database of their iPhone</a:t>
+              <a:t>provide our users with a simple solution to “ingredient constricted” meal conflicts by providing them with prospective meals exclusive to </a:t>
+            </a:r>
+            <a:r>
+              <a:rPr lang="en-US" dirty="0" smtClean="0"/>
+              <a:t>the ingredients </a:t>
+            </a:r>
+            <a:r>
+              <a:rPr lang="en-US" dirty="0" smtClean="0"/>
+              <a:t>they may have at a certain time.</a:t>
+            </a:r>
+            <a:endParaRPr lang="en-US" dirty="0" smtClean="0"/>
+          </a:p>
+          <a:p>
+            <a:r>
+              <a:rPr lang="en-US" dirty="0" smtClean="0"/>
+              <a:t>By </a:t>
+            </a:r>
+            <a:r>
+              <a:rPr lang="en-US" dirty="0" smtClean="0"/>
+              <a:t>providing results instantly, the application emulates the amazing instinct </a:t>
+            </a:r>
+            <a:r>
+              <a:rPr lang="en-US" dirty="0" smtClean="0"/>
+              <a:t>of a master </a:t>
+            </a:r>
+            <a:r>
+              <a:rPr lang="en-US" dirty="0" smtClean="0"/>
+              <a:t>chef as it allows </a:t>
+            </a:r>
+            <a:r>
+              <a:rPr lang="en-US" dirty="0" smtClean="0"/>
+              <a:t>the </a:t>
+            </a:r>
+            <a:r>
+              <a:rPr lang="en-US" dirty="0" smtClean="0"/>
+              <a:t>user to </a:t>
+            </a:r>
+            <a:r>
+              <a:rPr lang="en-US" dirty="0" smtClean="0"/>
+              <a:t>seamlessly </a:t>
+            </a:r>
+            <a:r>
+              <a:rPr lang="en-US" dirty="0" smtClean="0"/>
+              <a:t>engage the contents </a:t>
+            </a:r>
+            <a:r>
+              <a:rPr lang="en-US" dirty="0" smtClean="0"/>
+              <a:t>his </a:t>
+            </a:r>
+            <a:r>
+              <a:rPr lang="en-US" dirty="0" smtClean="0"/>
+              <a:t>refrigerator with the recipes found in the database </a:t>
+            </a:r>
+            <a:r>
+              <a:rPr lang="en-US" dirty="0" smtClean="0"/>
+              <a:t>of the application</a:t>
             </a:r>
             <a:endParaRPr lang="en-US" dirty="0"/>
           </a:p>
@@ -3753,102 +3917,13 @@
   <p:clrMapOvr>
     <a:masterClrMapping/>
   </p:clrMapOvr>
-</p:sld>
-</file>
-
-<file path=ppt/slides/slide3.xml><?xml version="1.0" encoding="utf-8"?>
-<p:sld xmlns:a="http://schemas.openxmlformats.org/drawingml/2006/main" xmlns:r="http://schemas.openxmlformats.org/officeDocument/2006/relationships" xmlns:p="http://schemas.openxmlformats.org/presentationml/2006/main">
-  <p:cSld>
-    <p:spTree>
-      <p:nvGrpSpPr>
-        <p:cNvPr id="1" name=""/>
-        <p:cNvGrpSpPr/>
-        <p:nvPr/>
-      </p:nvGrpSpPr>
-      <p:grpSpPr>
-        <a:xfrm>
-          <a:off x="0" y="0"/>
-          <a:ext cx="0" cy="0"/>
-          <a:chOff x="0" y="0"/>
-          <a:chExt cx="0" cy="0"/>
-        </a:xfrm>
-      </p:grpSpPr>
-      <p:sp>
-        <p:nvSpPr>
-          <p:cNvPr id="2" name="Title 1"/>
-          <p:cNvSpPr>
-            <a:spLocks noGrp="1"/>
-          </p:cNvSpPr>
-          <p:nvPr>
-            <p:ph type="title"/>
-          </p:nvPr>
-        </p:nvSpPr>
-        <p:spPr/>
-        <p:txBody>
-          <a:bodyPr/>
-          <a:lstStyle/>
-          <a:p>
-            <a:r>
-              <a:rPr lang="en-US" dirty="0" smtClean="0"/>
-              <a:t>How will we do it</a:t>
-            </a:r>
-            <a:endParaRPr lang="en-US" dirty="0"/>
-          </a:p>
-        </p:txBody>
-      </p:sp>
-      <p:sp>
-        <p:nvSpPr>
-          <p:cNvPr id="3" name="Content Placeholder 2"/>
-          <p:cNvSpPr>
-            <a:spLocks noGrp="1"/>
-          </p:cNvSpPr>
-          <p:nvPr>
-            <p:ph sz="quarter" idx="13"/>
-          </p:nvPr>
-        </p:nvSpPr>
-        <p:spPr/>
-        <p:txBody>
-          <a:bodyPr/>
-          <a:lstStyle/>
-          <a:p>
-            <a:r>
-              <a:rPr lang="en-US" dirty="0" smtClean="0"/>
-              <a:t>We will allow the user to filter recipes by not only their ingredients, but also possible categories such as the time it would take to prepare and cook the recipe, whether the meal will be breakfast, lunch or dinner, and also by the difficulty it would take to prepare the meal.</a:t>
-            </a:r>
-          </a:p>
-          <a:p>
-            <a:r>
-              <a:rPr lang="en-US" dirty="0" smtClean="0"/>
-              <a:t>This will hopefully lower the amount of times that the chef gives up on their meal, whether it be tossing their burnt burger into the waste basket or compromising an omelet for scrambled eggs.</a:t>
-            </a:r>
-          </a:p>
-          <a:p>
-            <a:r>
-              <a:rPr lang="en-US" dirty="0" smtClean="0"/>
-              <a:t>Also, hopefully new cooks will be inspired to attempt cooking as our easier </a:t>
-            </a:r>
-            <a:r>
-              <a:rPr lang="en-US" dirty="0" err="1" smtClean="0"/>
-              <a:t>recipies</a:t>
-            </a:r>
-            <a:r>
-              <a:rPr lang="en-US" dirty="0" smtClean="0"/>
-              <a:t> are easily </a:t>
-            </a:r>
-            <a:endParaRPr lang="en-US" dirty="0"/>
-          </a:p>
-        </p:txBody>
-      </p:sp>
-    </p:spTree>
-    <p:extLst>
-      <p:ext uri="{BB962C8B-B14F-4D97-AF65-F5344CB8AC3E}">
-        <p14:creationId xmlns:p14="http://schemas.microsoft.com/office/powerpoint/2010/main" val="1710620712"/>
-      </p:ext>
-    </p:extLst>
-  </p:cSld>
-  <p:clrMapOvr>
-    <a:masterClrMapping/>
-  </p:clrMapOvr>
+  <p:timing>
+    <p:tnLst>
+      <p:par>
+        <p:cTn xmlns:p14="http://schemas.microsoft.com/office/powerpoint/2010/main" id="1" dur="indefinite" restart="never" nodeType="tmRoot"/>
+      </p:par>
+    </p:tnLst>
+  </p:timing>
 </p:sld>
 </file>
 
@@ -3886,7 +3961,7 @@
           <a:p>
             <a:r>
               <a:rPr lang="en-US" dirty="0" smtClean="0"/>
-              <a:t>In action…</a:t>
+              <a:t>Thus Far…</a:t>
             </a:r>
             <a:endParaRPr lang="en-US" dirty="0"/>
           </a:p>
@@ -3907,6 +3982,43 @@
           <a:bodyPr/>
           <a:lstStyle/>
           <a:p>
+            <a:r>
+              <a:rPr lang="en-US" dirty="0" smtClean="0"/>
+              <a:t>Acclimated to Objective-C coding</a:t>
+            </a:r>
+          </a:p>
+          <a:p>
+            <a:r>
+              <a:rPr lang="en-US" dirty="0" smtClean="0"/>
+              <a:t>Completed the rudiments of the application</a:t>
+            </a:r>
+          </a:p>
+          <a:p>
+            <a:pPr lvl="1"/>
+            <a:r>
+              <a:rPr lang="en-US" dirty="0" smtClean="0"/>
+              <a:t>The blueprints for the separate screens included in the application</a:t>
+            </a:r>
+          </a:p>
+          <a:p>
+            <a:pPr lvl="1"/>
+            <a:r>
+              <a:rPr lang="en-US" dirty="0" smtClean="0"/>
+              <a:t>The basic functionalities</a:t>
+            </a:r>
+          </a:p>
+          <a:p>
+            <a:pPr lvl="1"/>
+            <a:r>
+              <a:rPr lang="en-US" dirty="0" smtClean="0"/>
+              <a:t>Coding minutia </a:t>
+            </a:r>
+          </a:p>
+          <a:p>
+            <a:r>
+              <a:rPr lang="en-US" dirty="0" smtClean="0"/>
+              <a:t>Developed the database that will be used to integrate the plethora of recipes into the application itself </a:t>
+            </a:r>
             <a:endParaRPr lang="en-US" dirty="0"/>
           </a:p>
         </p:txBody>
@@ -3914,13 +4026,20 @@
     </p:spTree>
     <p:extLst>
       <p:ext uri="{BB962C8B-B14F-4D97-AF65-F5344CB8AC3E}">
-        <p14:creationId xmlns:p14="http://schemas.microsoft.com/office/powerpoint/2010/main" val="167044052"/>
+        <p14:creationId xmlns:p14="http://schemas.microsoft.com/office/powerpoint/2010/main" val="2221320924"/>
       </p:ext>
     </p:extLst>
   </p:cSld>
   <p:clrMapOvr>
     <a:masterClrMapping/>
   </p:clrMapOvr>
+  <p:timing>
+    <p:tnLst>
+      <p:par>
+        <p:cTn xmlns:p14="http://schemas.microsoft.com/office/powerpoint/2010/main" id="1" dur="indefinite" restart="never" nodeType="tmRoot"/>
+      </p:par>
+    </p:tnLst>
+  </p:timing>
 </p:sld>
 </file>
 
@@ -3958,7 +4077,7 @@
           <a:p>
             <a:r>
               <a:rPr lang="en-US" dirty="0" smtClean="0"/>
-              <a:t>In conclusion</a:t>
+              <a:t>In action…</a:t>
             </a:r>
             <a:endParaRPr lang="en-US" dirty="0"/>
           </a:p>
@@ -3979,13 +4098,204 @@
           <a:bodyPr/>
           <a:lstStyle/>
           <a:p>
+            <a:endParaRPr lang="en-US" dirty="0"/>
+          </a:p>
+        </p:txBody>
+      </p:sp>
+    </p:spTree>
+    <p:extLst>
+      <p:ext uri="{BB962C8B-B14F-4D97-AF65-F5344CB8AC3E}">
+        <p14:creationId xmlns:p14="http://schemas.microsoft.com/office/powerpoint/2010/main" val="167044052"/>
+      </p:ext>
+    </p:extLst>
+  </p:cSld>
+  <p:clrMapOvr>
+    <a:masterClrMapping/>
+  </p:clrMapOvr>
+  <p:timing>
+    <p:tnLst>
+      <p:par>
+        <p:cTn xmlns:p14="http://schemas.microsoft.com/office/powerpoint/2010/main" id="1" dur="indefinite" restart="never" nodeType="tmRoot"/>
+      </p:par>
+    </p:tnLst>
+  </p:timing>
+</p:sld>
+</file>
+
+<file path=ppt/slides/slide6.xml><?xml version="1.0" encoding="utf-8"?>
+<p:sld xmlns:a="http://schemas.openxmlformats.org/drawingml/2006/main" xmlns:r="http://schemas.openxmlformats.org/officeDocument/2006/relationships" xmlns:p="http://schemas.openxmlformats.org/presentationml/2006/main">
+  <p:cSld>
+    <p:spTree>
+      <p:nvGrpSpPr>
+        <p:cNvPr id="1" name=""/>
+        <p:cNvGrpSpPr/>
+        <p:nvPr/>
+      </p:nvGrpSpPr>
+      <p:grpSpPr>
+        <a:xfrm>
+          <a:off x="0" y="0"/>
+          <a:ext cx="0" cy="0"/>
+          <a:chOff x="0" y="0"/>
+          <a:chExt cx="0" cy="0"/>
+        </a:xfrm>
+      </p:grpSpPr>
+      <p:sp>
+        <p:nvSpPr>
+          <p:cNvPr id="2" name="Title 1"/>
+          <p:cNvSpPr>
+            <a:spLocks noGrp="1"/>
+          </p:cNvSpPr>
+          <p:nvPr>
+            <p:ph type="title"/>
+          </p:nvPr>
+        </p:nvSpPr>
+        <p:spPr/>
+        <p:txBody>
+          <a:bodyPr/>
+          <a:lstStyle/>
+          <a:p>
             <a:r>
               <a:rPr lang="en-US" dirty="0" smtClean="0"/>
-              <a:t>While our database of recipes and the functionality of the application is still growing</a:t>
-            </a:r>
-            <a:r>
-              <a:rPr lang="en-US" smtClean="0"/>
-              <a:t>, </a:t>
+              <a:t>roadblocks</a:t>
+            </a:r>
+            <a:endParaRPr lang="en-US" dirty="0"/>
+          </a:p>
+        </p:txBody>
+      </p:sp>
+      <p:sp>
+        <p:nvSpPr>
+          <p:cNvPr id="3" name="Content Placeholder 2"/>
+          <p:cNvSpPr>
+            <a:spLocks noGrp="1"/>
+          </p:cNvSpPr>
+          <p:nvPr>
+            <p:ph sz="quarter" idx="13"/>
+          </p:nvPr>
+        </p:nvSpPr>
+        <p:spPr/>
+        <p:txBody>
+          <a:bodyPr/>
+          <a:lstStyle/>
+          <a:p>
+            <a:r>
+              <a:rPr lang="en-US" dirty="0" smtClean="0"/>
+              <a:t>The lack of time, recourses, and prior knowledge</a:t>
+            </a:r>
+          </a:p>
+          <a:p>
+            <a:pPr lvl="1"/>
+            <a:r>
+              <a:rPr lang="en-US" dirty="0" smtClean="0"/>
+              <a:t>In light of the fairly minimal time and resources allotted, we will not be able to advance our application the the initially envisioned extent</a:t>
+            </a:r>
+          </a:p>
+          <a:p>
+            <a:pPr lvl="1"/>
+            <a:r>
+              <a:rPr lang="en-US" dirty="0" smtClean="0"/>
+              <a:t>Acquainting to the nuances of Objective C coding  </a:t>
+            </a:r>
+          </a:p>
+        </p:txBody>
+      </p:sp>
+    </p:spTree>
+    <p:extLst>
+      <p:ext uri="{BB962C8B-B14F-4D97-AF65-F5344CB8AC3E}">
+        <p14:creationId xmlns:p14="http://schemas.microsoft.com/office/powerpoint/2010/main" val="2006186198"/>
+      </p:ext>
+    </p:extLst>
+  </p:cSld>
+  <p:clrMapOvr>
+    <a:masterClrMapping/>
+  </p:clrMapOvr>
+  <p:timing>
+    <p:tnLst>
+      <p:par>
+        <p:cTn xmlns:p14="http://schemas.microsoft.com/office/powerpoint/2010/main" id="1" dur="indefinite" restart="never" nodeType="tmRoot"/>
+      </p:par>
+    </p:tnLst>
+  </p:timing>
+</p:sld>
+</file>
+
+<file path=ppt/slides/slide7.xml><?xml version="1.0" encoding="utf-8"?>
+<p:sld xmlns:a="http://schemas.openxmlformats.org/drawingml/2006/main" xmlns:r="http://schemas.openxmlformats.org/officeDocument/2006/relationships" xmlns:p="http://schemas.openxmlformats.org/presentationml/2006/main">
+  <p:cSld>
+    <p:spTree>
+      <p:nvGrpSpPr>
+        <p:cNvPr id="1" name=""/>
+        <p:cNvGrpSpPr/>
+        <p:nvPr/>
+      </p:nvGrpSpPr>
+      <p:grpSpPr>
+        <a:xfrm>
+          <a:off x="0" y="0"/>
+          <a:ext cx="0" cy="0"/>
+          <a:chOff x="0" y="0"/>
+          <a:chExt cx="0" cy="0"/>
+        </a:xfrm>
+      </p:grpSpPr>
+      <p:sp>
+        <p:nvSpPr>
+          <p:cNvPr id="2" name="Title 1"/>
+          <p:cNvSpPr>
+            <a:spLocks noGrp="1"/>
+          </p:cNvSpPr>
+          <p:nvPr>
+            <p:ph type="title"/>
+          </p:nvPr>
+        </p:nvSpPr>
+        <p:spPr/>
+        <p:txBody>
+          <a:bodyPr/>
+          <a:lstStyle/>
+          <a:p>
+            <a:r>
+              <a:rPr lang="en-US" dirty="0" smtClean="0"/>
+              <a:t>From here on…</a:t>
+            </a:r>
+            <a:endParaRPr lang="en-US" dirty="0"/>
+          </a:p>
+        </p:txBody>
+      </p:sp>
+      <p:sp>
+        <p:nvSpPr>
+          <p:cNvPr id="3" name="Content Placeholder 2"/>
+          <p:cNvSpPr>
+            <a:spLocks noGrp="1"/>
+          </p:cNvSpPr>
+          <p:nvPr>
+            <p:ph sz="quarter" idx="13"/>
+          </p:nvPr>
+        </p:nvSpPr>
+        <p:spPr/>
+        <p:txBody>
+          <a:bodyPr/>
+          <a:lstStyle/>
+          <a:p>
+            <a:r>
+              <a:rPr lang="en-US" dirty="0" smtClean="0"/>
+              <a:t>Complete all coding and thus all tables, screens, and essentially all aspects of the application</a:t>
+            </a:r>
+          </a:p>
+          <a:p>
+            <a:r>
+              <a:rPr lang="en-US" dirty="0" smtClean="0"/>
+              <a:t>Input all recipes into the created database</a:t>
+            </a:r>
+          </a:p>
+          <a:p>
+            <a:r>
+              <a:rPr lang="en-US" dirty="0" smtClean="0"/>
+              <a:t>Polish and make the </a:t>
+            </a:r>
+            <a:r>
+              <a:rPr lang="en-US" dirty="0"/>
+              <a:t>a</a:t>
+            </a:r>
+            <a:r>
+              <a:rPr lang="en-US" dirty="0" smtClean="0"/>
+              <a:t>pplication aesthetically pleasing</a:t>
             </a:r>
             <a:endParaRPr lang="en-US" dirty="0"/>
           </a:p>
@@ -4001,6 +4311,13 @@
   <p:clrMapOvr>
     <a:masterClrMapping/>
   </p:clrMapOvr>
+  <p:timing>
+    <p:tnLst>
+      <p:par>
+        <p:cTn xmlns:p14="http://schemas.microsoft.com/office/powerpoint/2010/main" id="1" dur="indefinite" restart="never" nodeType="tmRoot"/>
+      </p:par>
+    </p:tnLst>
+  </p:timing>
 </p:sld>
 </file>
 

</xml_diff>